<commit_message>
fixing st slide show
</commit_message>
<xml_diff>
--- a/Report/BaoVe/TrinhDien/Slide.pptx
+++ b/Report/BaoVe/TrinhDien/Slide.pptx
@@ -4601,6 +4601,27 @@
           <a:bodyPr/>
           <a:lstStyle/>
           <a:p>
+            <a:pPr marL="0" indent="0">
+              <a:buNone/>
+            </a:pPr>
+            <a:r>
+              <a:rPr lang="en-US" sz="2800" u="sng" dirty="0" err="1" smtClean="0"/>
+              <a:t>Chức</a:t>
+            </a:r>
+            <a:r>
+              <a:rPr lang="en-US" sz="2800" u="sng" dirty="0" smtClean="0"/>
+              <a:t> </a:t>
+            </a:r>
+            <a:r>
+              <a:rPr lang="en-US" sz="2800" u="sng" dirty="0" err="1" smtClean="0"/>
+              <a:t>năng</a:t>
+            </a:r>
+            <a:r>
+              <a:rPr lang="en-US" sz="2800" u="sng" dirty="0" smtClean="0"/>
+              <a:t>:</a:t>
+            </a:r>
+          </a:p>
+          <a:p>
             <a:r>
               <a:rPr lang="en-US" sz="2800" dirty="0" err="1" smtClean="0"/>
               <a:t>Ứng</a:t>
@@ -5344,12 +5365,34 @@
           <a:bodyPr/>
           <a:lstStyle/>
           <a:p>
-            <a:r>
-              <a:rPr lang="en-US" sz="2800" dirty="0" err="1"/>
+            <a:pPr marL="0" indent="0">
+              <a:buNone/>
+            </a:pPr>
+            <a:r>
+              <a:rPr lang="en-US" sz="2800" u="sng" dirty="0" err="1"/>
+              <a:t>Chức</a:t>
+            </a:r>
+            <a:r>
+              <a:rPr lang="en-US" sz="2800" u="sng" dirty="0"/>
+              <a:t> </a:t>
+            </a:r>
+            <a:r>
+              <a:rPr lang="en-US" sz="2800" u="sng" dirty="0" err="1"/>
+              <a:t>năng</a:t>
+            </a:r>
+            <a:r>
+              <a:rPr lang="en-US" sz="2800" u="sng" dirty="0" smtClean="0"/>
+              <a:t>:</a:t>
+            </a:r>
+            <a:endParaRPr lang="en-US" sz="2800" dirty="0" smtClean="0"/>
+          </a:p>
+          <a:p>
+            <a:r>
+              <a:rPr lang="en-US" sz="2800" dirty="0" err="1" smtClean="0"/>
               <a:t>Ứng</a:t>
             </a:r>
             <a:r>
-              <a:rPr lang="en-US" sz="2800" dirty="0"/>
+              <a:rPr lang="en-US" sz="2800" dirty="0" smtClean="0"/>
               <a:t> </a:t>
             </a:r>
             <a:r>
@@ -5412,687 +5455,687 @@
           <a:p>
             <a:pPr lvl="1"/>
             <a:r>
-              <a:rPr lang="en-US" sz="2800" dirty="0" err="1"/>
+              <a:rPr lang="en-US" sz="2500" dirty="0" err="1"/>
               <a:t>Xem</a:t>
             </a:r>
             <a:r>
-              <a:rPr lang="en-US" sz="2800" dirty="0"/>
-              <a:t> </a:t>
-            </a:r>
-            <a:r>
-              <a:rPr lang="en-US" sz="2800" dirty="0" err="1"/>
+              <a:rPr lang="en-US" sz="2500" dirty="0"/>
+              <a:t> </a:t>
+            </a:r>
+            <a:r>
+              <a:rPr lang="en-US" sz="2500" dirty="0" err="1"/>
               <a:t>thời</a:t>
             </a:r>
             <a:r>
-              <a:rPr lang="en-US" sz="2800" dirty="0"/>
-              <a:t> </a:t>
-            </a:r>
-            <a:r>
-              <a:rPr lang="en-US" sz="2800" dirty="0" err="1"/>
+              <a:rPr lang="en-US" sz="2500" dirty="0"/>
+              <a:t> </a:t>
+            </a:r>
+            <a:r>
+              <a:rPr lang="en-US" sz="2500" dirty="0" err="1"/>
               <a:t>gian</a:t>
             </a:r>
             <a:r>
-              <a:rPr lang="en-US" sz="2800" dirty="0"/>
-              <a:t> </a:t>
-            </a:r>
-            <a:r>
-              <a:rPr lang="en-US" sz="2800" dirty="0" err="1"/>
+              <a:rPr lang="en-US" sz="2500" dirty="0"/>
+              <a:t> </a:t>
+            </a:r>
+            <a:r>
+              <a:rPr lang="en-US" sz="2500" dirty="0" err="1"/>
               <a:t>chăm</a:t>
             </a:r>
             <a:r>
-              <a:rPr lang="en-US" sz="2800" dirty="0"/>
-              <a:t> </a:t>
-            </a:r>
-            <a:r>
-              <a:rPr lang="en-US" sz="2800" dirty="0" err="1"/>
+              <a:rPr lang="en-US" sz="2500" dirty="0"/>
+              <a:t> </a:t>
+            </a:r>
+            <a:r>
+              <a:rPr lang="en-US" sz="2500" dirty="0" err="1"/>
               <a:t>sóc</a:t>
             </a:r>
             <a:r>
-              <a:rPr lang="en-US" sz="2800" dirty="0"/>
-              <a:t> </a:t>
-            </a:r>
-            <a:r>
-              <a:rPr lang="en-US" sz="2800" dirty="0" err="1"/>
+              <a:rPr lang="en-US" sz="2500" dirty="0"/>
+              <a:t> </a:t>
+            </a:r>
+            <a:r>
+              <a:rPr lang="en-US" sz="2500" dirty="0" err="1"/>
               <a:t>khách</a:t>
             </a:r>
             <a:r>
-              <a:rPr lang="en-US" sz="2800" dirty="0"/>
-              <a:t> </a:t>
-            </a:r>
-            <a:r>
-              <a:rPr lang="en-US" sz="2800" dirty="0" err="1"/>
+              <a:rPr lang="en-US" sz="2500" dirty="0"/>
+              <a:t> </a:t>
+            </a:r>
+            <a:r>
+              <a:rPr lang="en-US" sz="2500" dirty="0" err="1"/>
               <a:t>hàng</a:t>
             </a:r>
             <a:r>
-              <a:rPr lang="en-US" sz="2800" dirty="0"/>
-              <a:t> </a:t>
-            </a:r>
-            <a:r>
-              <a:rPr lang="en-US" sz="2800" dirty="0" err="1"/>
+              <a:rPr lang="en-US" sz="2500" dirty="0"/>
+              <a:t> </a:t>
+            </a:r>
+            <a:r>
+              <a:rPr lang="en-US" sz="2500" dirty="0" err="1"/>
               <a:t>của</a:t>
             </a:r>
             <a:r>
-              <a:rPr lang="en-US" sz="2800" dirty="0"/>
-              <a:t> </a:t>
-            </a:r>
-            <a:r>
-              <a:rPr lang="en-US" sz="2800" dirty="0" err="1"/>
+              <a:rPr lang="en-US" sz="2500" dirty="0"/>
+              <a:t> </a:t>
+            </a:r>
+            <a:r>
+              <a:rPr lang="en-US" sz="2500" dirty="0" err="1"/>
               <a:t>nhân</a:t>
             </a:r>
             <a:r>
-              <a:rPr lang="en-US" sz="2800" dirty="0"/>
-              <a:t> </a:t>
-            </a:r>
-            <a:r>
-              <a:rPr lang="en-US" sz="2800" dirty="0" err="1"/>
+              <a:rPr lang="en-US" sz="2500" dirty="0"/>
+              <a:t> </a:t>
+            </a:r>
+            <a:r>
+              <a:rPr lang="en-US" sz="2500" dirty="0" err="1"/>
               <a:t>viên</a:t>
             </a:r>
-            <a:endParaRPr lang="en-US" sz="2800" dirty="0"/>
+            <a:endParaRPr lang="en-US" sz="2500" dirty="0"/>
           </a:p>
           <a:p>
             <a:pPr lvl="1"/>
             <a:r>
-              <a:rPr lang="en-US" sz="2800" dirty="0" err="1"/>
+              <a:rPr lang="en-US" sz="2500" dirty="0" err="1"/>
               <a:t>Xem</a:t>
             </a:r>
             <a:r>
-              <a:rPr lang="en-US" sz="2800" dirty="0"/>
-              <a:t> </a:t>
-            </a:r>
-            <a:r>
-              <a:rPr lang="en-US" sz="2800" dirty="0" err="1"/>
+              <a:rPr lang="en-US" sz="2500" dirty="0"/>
+              <a:t> </a:t>
+            </a:r>
+            <a:r>
+              <a:rPr lang="en-US" sz="2500" dirty="0" err="1"/>
               <a:t>kế</a:t>
             </a:r>
             <a:r>
-              <a:rPr lang="en-US" sz="2800" dirty="0"/>
-              <a:t> </a:t>
-            </a:r>
-            <a:r>
-              <a:rPr lang="en-US" sz="2800" dirty="0" err="1"/>
+              <a:rPr lang="en-US" sz="2500" dirty="0"/>
+              <a:t> </a:t>
+            </a:r>
+            <a:r>
+              <a:rPr lang="en-US" sz="2500" dirty="0" err="1"/>
               <a:t>hoạch</a:t>
             </a:r>
             <a:r>
-              <a:rPr lang="en-US" sz="2800" dirty="0"/>
-              <a:t> </a:t>
-            </a:r>
-            <a:r>
-              <a:rPr lang="en-US" sz="2800" dirty="0" err="1"/>
+              <a:rPr lang="en-US" sz="2500" dirty="0"/>
+              <a:t> </a:t>
+            </a:r>
+            <a:r>
+              <a:rPr lang="en-US" sz="2500" dirty="0" err="1"/>
               <a:t>của</a:t>
             </a:r>
             <a:r>
-              <a:rPr lang="en-US" sz="2800" dirty="0"/>
-              <a:t> </a:t>
-            </a:r>
-            <a:r>
-              <a:rPr lang="en-US" sz="2800" dirty="0" err="1"/>
+              <a:rPr lang="en-US" sz="2500" dirty="0"/>
+              <a:t> </a:t>
+            </a:r>
+            <a:r>
+              <a:rPr lang="en-US" sz="2500" dirty="0" err="1"/>
               <a:t>nhân</a:t>
             </a:r>
             <a:r>
-              <a:rPr lang="en-US" sz="2800" dirty="0"/>
-              <a:t> </a:t>
-            </a:r>
-            <a:r>
-              <a:rPr lang="en-US" sz="2800" dirty="0" err="1"/>
+              <a:rPr lang="en-US" sz="2500" dirty="0"/>
+              <a:t> </a:t>
+            </a:r>
+            <a:r>
+              <a:rPr lang="en-US" sz="2500" dirty="0" err="1"/>
               <a:t>viên</a:t>
             </a:r>
             <a:r>
-              <a:rPr lang="en-US" sz="2800" dirty="0"/>
-              <a:t> </a:t>
-            </a:r>
-            <a:r>
-              <a:rPr lang="en-US" sz="2800" dirty="0" err="1"/>
+              <a:rPr lang="en-US" sz="2500" dirty="0"/>
+              <a:t> </a:t>
+            </a:r>
+            <a:r>
+              <a:rPr lang="en-US" sz="2500" dirty="0" err="1"/>
               <a:t>theo</a:t>
             </a:r>
             <a:r>
-              <a:rPr lang="en-US" sz="2800" dirty="0"/>
-              <a:t> </a:t>
-            </a:r>
-            <a:r>
-              <a:rPr lang="en-US" sz="2800" dirty="0" err="1"/>
+              <a:rPr lang="en-US" sz="2500" dirty="0"/>
+              <a:t> </a:t>
+            </a:r>
+            <a:r>
+              <a:rPr lang="en-US" sz="2500" dirty="0" err="1"/>
               <a:t>thời</a:t>
             </a:r>
             <a:r>
-              <a:rPr lang="en-US" sz="2800" dirty="0"/>
-              <a:t> </a:t>
-            </a:r>
-            <a:r>
-              <a:rPr lang="en-US" sz="2800" dirty="0" err="1"/>
+              <a:rPr lang="en-US" sz="2500" dirty="0"/>
+              <a:t> </a:t>
+            </a:r>
+            <a:r>
+              <a:rPr lang="en-US" sz="2500" dirty="0" err="1"/>
               <a:t>gian</a:t>
             </a:r>
-            <a:endParaRPr lang="en-US" sz="2800" dirty="0"/>
+            <a:endParaRPr lang="en-US" sz="2500" dirty="0"/>
           </a:p>
           <a:p>
             <a:pPr lvl="1"/>
             <a:r>
-              <a:rPr lang="en-US" sz="2800" dirty="0"/>
+              <a:rPr lang="en-US" sz="2500" dirty="0"/>
               <a:t>So </a:t>
             </a:r>
             <a:r>
-              <a:rPr lang="en-US" sz="2800" dirty="0" err="1"/>
+              <a:rPr lang="en-US" sz="2500" dirty="0" err="1"/>
               <a:t>sánh</a:t>
             </a:r>
             <a:r>
-              <a:rPr lang="en-US" sz="2800" dirty="0"/>
-              <a:t> </a:t>
-            </a:r>
-            <a:r>
-              <a:rPr lang="en-US" sz="2800" dirty="0" err="1"/>
+              <a:rPr lang="en-US" sz="2500" dirty="0"/>
+              <a:t> </a:t>
+            </a:r>
+            <a:r>
+              <a:rPr lang="en-US" sz="2500" dirty="0" err="1"/>
               <a:t>kế</a:t>
             </a:r>
             <a:r>
-              <a:rPr lang="en-US" sz="2800" dirty="0"/>
-              <a:t> </a:t>
-            </a:r>
-            <a:r>
-              <a:rPr lang="en-US" sz="2800" dirty="0" err="1"/>
+              <a:rPr lang="en-US" sz="2500" dirty="0"/>
+              <a:t> </a:t>
+            </a:r>
+            <a:r>
+              <a:rPr lang="en-US" sz="2500" dirty="0" err="1"/>
               <a:t>hoạch</a:t>
             </a:r>
             <a:r>
-              <a:rPr lang="en-US" sz="2800" dirty="0"/>
+              <a:rPr lang="en-US" sz="2500" dirty="0"/>
               <a:t> so </a:t>
             </a:r>
             <a:r>
-              <a:rPr lang="en-US" sz="2800" dirty="0" err="1"/>
+              <a:rPr lang="en-US" sz="2500" dirty="0" err="1"/>
               <a:t>với</a:t>
             </a:r>
             <a:r>
-              <a:rPr lang="en-US" sz="2800" dirty="0"/>
-              <a:t> </a:t>
-            </a:r>
-            <a:r>
-              <a:rPr lang="en-US" sz="2800" dirty="0" err="1"/>
+              <a:rPr lang="en-US" sz="2500" dirty="0"/>
+              <a:t> </a:t>
+            </a:r>
+            <a:r>
+              <a:rPr lang="en-US" sz="2500" dirty="0" err="1"/>
               <a:t>ngày</a:t>
             </a:r>
             <a:r>
-              <a:rPr lang="en-US" sz="2800" dirty="0"/>
-              <a:t> </a:t>
-            </a:r>
-            <a:r>
-              <a:rPr lang="en-US" sz="2800" dirty="0" err="1"/>
+              <a:rPr lang="en-US" sz="2500" dirty="0"/>
+              <a:t> </a:t>
+            </a:r>
+            <a:r>
+              <a:rPr lang="en-US" sz="2500" dirty="0" err="1"/>
               <a:t>làm</a:t>
             </a:r>
             <a:r>
-              <a:rPr lang="en-US" sz="2800" dirty="0"/>
-              <a:t> </a:t>
-            </a:r>
-            <a:r>
-              <a:rPr lang="en-US" sz="2800" dirty="0" err="1"/>
+              <a:rPr lang="en-US" sz="2500" dirty="0"/>
+              <a:t> </a:t>
+            </a:r>
+            <a:r>
+              <a:rPr lang="en-US" sz="2500" dirty="0" err="1"/>
               <a:t>việc</a:t>
             </a:r>
             <a:r>
-              <a:rPr lang="en-US" sz="2800" dirty="0"/>
-              <a:t> </a:t>
-            </a:r>
-            <a:r>
-              <a:rPr lang="en-US" sz="2800" dirty="0" err="1"/>
+              <a:rPr lang="en-US" sz="2500" dirty="0"/>
+              <a:t> </a:t>
+            </a:r>
+            <a:r>
+              <a:rPr lang="en-US" sz="2500" dirty="0" err="1"/>
               <a:t>thực</a:t>
             </a:r>
             <a:r>
-              <a:rPr lang="en-US" sz="2800" dirty="0"/>
-              <a:t> </a:t>
-            </a:r>
-            <a:r>
-              <a:rPr lang="en-US" sz="2800" dirty="0" err="1"/>
+              <a:rPr lang="en-US" sz="2500" dirty="0"/>
+              <a:t> </a:t>
+            </a:r>
+            <a:r>
+              <a:rPr lang="en-US" sz="2500" dirty="0" err="1"/>
               <a:t>tế</a:t>
             </a:r>
             <a:r>
-              <a:rPr lang="en-US" sz="2800" dirty="0"/>
-              <a:t> </a:t>
-            </a:r>
-            <a:r>
-              <a:rPr lang="en-US" sz="2800" dirty="0" err="1"/>
+              <a:rPr lang="en-US" sz="2500" dirty="0"/>
+              <a:t> </a:t>
+            </a:r>
+            <a:r>
+              <a:rPr lang="en-US" sz="2500" dirty="0" err="1"/>
               <a:t>của</a:t>
             </a:r>
             <a:r>
-              <a:rPr lang="en-US" sz="2800" dirty="0"/>
-              <a:t> </a:t>
-            </a:r>
-            <a:r>
-              <a:rPr lang="en-US" sz="2800" dirty="0" err="1"/>
+              <a:rPr lang="en-US" sz="2500" dirty="0"/>
+              <a:t> </a:t>
+            </a:r>
+            <a:r>
+              <a:rPr lang="en-US" sz="2500" dirty="0" err="1"/>
               <a:t>nhân</a:t>
             </a:r>
             <a:r>
-              <a:rPr lang="en-US" sz="2800" dirty="0"/>
-              <a:t> </a:t>
-            </a:r>
-            <a:r>
-              <a:rPr lang="en-US" sz="2800" dirty="0" err="1"/>
+              <a:rPr lang="en-US" sz="2500" dirty="0"/>
+              <a:t> </a:t>
+            </a:r>
+            <a:r>
+              <a:rPr lang="en-US" sz="2500" dirty="0" err="1"/>
               <a:t>viên</a:t>
             </a:r>
-            <a:endParaRPr lang="en-US" sz="2800" dirty="0"/>
+            <a:endParaRPr lang="en-US" sz="2500" dirty="0"/>
           </a:p>
           <a:p>
             <a:pPr lvl="1"/>
             <a:r>
-              <a:rPr lang="en-US" sz="2800" dirty="0" err="1"/>
+              <a:rPr lang="en-US" sz="2500" dirty="0" err="1"/>
               <a:t>Xem</a:t>
             </a:r>
             <a:r>
-              <a:rPr lang="en-US" sz="2800" dirty="0"/>
+              <a:rPr lang="en-US" sz="2500" dirty="0"/>
               <a:t> album </a:t>
             </a:r>
             <a:r>
-              <a:rPr lang="en-US" sz="2800" dirty="0" err="1"/>
+              <a:rPr lang="en-US" sz="2500" dirty="0" err="1"/>
               <a:t>hình</a:t>
             </a:r>
             <a:r>
-              <a:rPr lang="en-US" sz="2800" dirty="0"/>
-              <a:t> </a:t>
-            </a:r>
-            <a:r>
-              <a:rPr lang="en-US" sz="2800" dirty="0" err="1"/>
+              <a:rPr lang="en-US" sz="2500" dirty="0"/>
+              <a:t> </a:t>
+            </a:r>
+            <a:r>
+              <a:rPr lang="en-US" sz="2500" dirty="0" err="1"/>
               <a:t>ảnh</a:t>
             </a:r>
             <a:r>
-              <a:rPr lang="en-US" sz="2800" dirty="0"/>
-              <a:t> </a:t>
-            </a:r>
-            <a:r>
-              <a:rPr lang="en-US" sz="2800" dirty="0" err="1"/>
+              <a:rPr lang="en-US" sz="2500" dirty="0"/>
+              <a:t> </a:t>
+            </a:r>
+            <a:r>
+              <a:rPr lang="en-US" sz="2500" dirty="0" err="1"/>
               <a:t>của</a:t>
             </a:r>
             <a:r>
-              <a:rPr lang="en-US" sz="2800" dirty="0"/>
-              <a:t> </a:t>
-            </a:r>
-            <a:r>
-              <a:rPr lang="en-US" sz="2800" dirty="0" err="1"/>
+              <a:rPr lang="en-US" sz="2500" dirty="0"/>
+              <a:t> </a:t>
+            </a:r>
+            <a:r>
+              <a:rPr lang="en-US" sz="2500" dirty="0" err="1"/>
               <a:t>các</a:t>
             </a:r>
             <a:r>
-              <a:rPr lang="en-US" sz="2800" dirty="0"/>
-              <a:t> </a:t>
-            </a:r>
-            <a:r>
-              <a:rPr lang="en-US" sz="2800" dirty="0" err="1"/>
+              <a:rPr lang="en-US" sz="2500" dirty="0"/>
+              <a:t> </a:t>
+            </a:r>
+            <a:r>
+              <a:rPr lang="en-US" sz="2500" dirty="0" err="1"/>
               <a:t>đại</a:t>
             </a:r>
             <a:r>
-              <a:rPr lang="en-US" sz="2800" dirty="0"/>
-              <a:t> </a:t>
-            </a:r>
-            <a:r>
-              <a:rPr lang="en-US" sz="2800" dirty="0" err="1"/>
+              <a:rPr lang="en-US" sz="2500" dirty="0"/>
+              <a:t> </a:t>
+            </a:r>
+            <a:r>
+              <a:rPr lang="en-US" sz="2500" dirty="0" err="1"/>
               <a:t>lý</a:t>
             </a:r>
             <a:r>
-              <a:rPr lang="en-US" sz="2800" dirty="0"/>
+              <a:rPr lang="en-US" sz="2500" dirty="0"/>
               <a:t>, </a:t>
             </a:r>
             <a:r>
-              <a:rPr lang="en-US" sz="2800" dirty="0" err="1"/>
+              <a:rPr lang="en-US" sz="2500" dirty="0" err="1"/>
               <a:t>cập</a:t>
             </a:r>
             <a:r>
-              <a:rPr lang="en-US" sz="2800" dirty="0"/>
-              <a:t> </a:t>
-            </a:r>
-            <a:r>
-              <a:rPr lang="en-US" sz="2800" dirty="0" err="1"/>
+              <a:rPr lang="en-US" sz="2500" dirty="0"/>
+              <a:t> </a:t>
+            </a:r>
+            <a:r>
+              <a:rPr lang="en-US" sz="2500" dirty="0" err="1"/>
               <a:t>nhật</a:t>
             </a:r>
             <a:r>
-              <a:rPr lang="en-US" sz="2800" dirty="0"/>
-              <a:t> </a:t>
-            </a:r>
-            <a:r>
-              <a:rPr lang="en-US" sz="2800" dirty="0" err="1"/>
+              <a:rPr lang="en-US" sz="2500" dirty="0"/>
+              <a:t> </a:t>
+            </a:r>
+            <a:r>
+              <a:rPr lang="en-US" sz="2500" dirty="0" err="1"/>
               <a:t>ảnh</a:t>
             </a:r>
             <a:r>
-              <a:rPr lang="en-US" sz="2800" dirty="0"/>
-              <a:t> </a:t>
-            </a:r>
-            <a:r>
-              <a:rPr lang="en-US" sz="2800" dirty="0" err="1"/>
+              <a:rPr lang="en-US" sz="2500" dirty="0"/>
+              <a:t> </a:t>
+            </a:r>
+            <a:r>
+              <a:rPr lang="en-US" sz="2500" dirty="0" err="1"/>
               <a:t>đại</a:t>
             </a:r>
             <a:r>
-              <a:rPr lang="en-US" sz="2800" dirty="0"/>
-              <a:t> </a:t>
-            </a:r>
-            <a:r>
-              <a:rPr lang="en-US" sz="2800" dirty="0" err="1"/>
+              <a:rPr lang="en-US" sz="2500" dirty="0"/>
+              <a:t> </a:t>
+            </a:r>
+            <a:r>
+              <a:rPr lang="en-US" sz="2500" dirty="0" err="1"/>
               <a:t>diện</a:t>
             </a:r>
-            <a:endParaRPr lang="en-US" sz="2800" dirty="0"/>
+            <a:endParaRPr lang="en-US" sz="2500" dirty="0"/>
           </a:p>
           <a:p>
             <a:pPr lvl="1"/>
             <a:r>
-              <a:rPr lang="en-US" sz="2800" dirty="0" err="1"/>
+              <a:rPr lang="en-US" sz="2500" dirty="0" err="1"/>
               <a:t>Quản</a:t>
             </a:r>
             <a:r>
-              <a:rPr lang="en-US" sz="2800" dirty="0"/>
-              <a:t> </a:t>
-            </a:r>
-            <a:r>
-              <a:rPr lang="en-US" sz="2800" dirty="0" err="1"/>
+              <a:rPr lang="en-US" sz="2500" dirty="0"/>
+              <a:t> </a:t>
+            </a:r>
+            <a:r>
+              <a:rPr lang="en-US" sz="2500" dirty="0" err="1"/>
               <a:t>lý</a:t>
             </a:r>
             <a:r>
-              <a:rPr lang="en-US" sz="2800" dirty="0"/>
-              <a:t> </a:t>
-            </a:r>
-            <a:r>
-              <a:rPr lang="en-US" sz="2800" dirty="0" err="1"/>
+              <a:rPr lang="en-US" sz="2500" dirty="0"/>
+              <a:t> </a:t>
+            </a:r>
+            <a:r>
+              <a:rPr lang="en-US" sz="2500" dirty="0" err="1"/>
               <a:t>các</a:t>
             </a:r>
             <a:r>
-              <a:rPr lang="en-US" sz="2800" dirty="0"/>
-              <a:t> </a:t>
-            </a:r>
-            <a:r>
-              <a:rPr lang="en-US" sz="2800" dirty="0" err="1"/>
+              <a:rPr lang="en-US" sz="2500" dirty="0"/>
+              <a:t> </a:t>
+            </a:r>
+            <a:r>
+              <a:rPr lang="en-US" sz="2500" dirty="0" err="1"/>
               <a:t>thông</a:t>
             </a:r>
             <a:r>
-              <a:rPr lang="en-US" sz="2800" dirty="0"/>
+              <a:rPr lang="en-US" sz="2500" dirty="0"/>
               <a:t> tin </a:t>
             </a:r>
             <a:r>
-              <a:rPr lang="en-US" sz="2800" dirty="0" err="1"/>
+              <a:rPr lang="en-US" sz="2500" dirty="0" err="1"/>
               <a:t>quản</a:t>
             </a:r>
             <a:r>
-              <a:rPr lang="en-US" sz="2800" dirty="0"/>
-              <a:t> </a:t>
-            </a:r>
-            <a:r>
-              <a:rPr lang="en-US" sz="2800" dirty="0" err="1"/>
+              <a:rPr lang="en-US" sz="2500" dirty="0"/>
+              <a:t> </a:t>
+            </a:r>
+            <a:r>
+              <a:rPr lang="en-US" sz="2500" dirty="0" err="1"/>
               <a:t>trị</a:t>
             </a:r>
             <a:r>
-              <a:rPr lang="en-US" sz="2800" dirty="0"/>
+              <a:rPr lang="en-US" sz="2500" dirty="0"/>
               <a:t> (Backend): </a:t>
             </a:r>
             <a:r>
-              <a:rPr lang="en-US" sz="2800" dirty="0" err="1"/>
+              <a:rPr lang="en-US" sz="2500" dirty="0" err="1"/>
               <a:t>Tài</a:t>
             </a:r>
             <a:r>
-              <a:rPr lang="en-US" sz="2800" dirty="0"/>
-              <a:t> </a:t>
-            </a:r>
-            <a:r>
-              <a:rPr lang="en-US" sz="2800" dirty="0" err="1"/>
+              <a:rPr lang="en-US" sz="2500" dirty="0"/>
+              <a:t> </a:t>
+            </a:r>
+            <a:r>
+              <a:rPr lang="en-US" sz="2500" dirty="0" err="1"/>
               <a:t>khoản</a:t>
             </a:r>
             <a:r>
-              <a:rPr lang="en-US" sz="2800" dirty="0"/>
-              <a:t> </a:t>
-            </a:r>
-            <a:r>
-              <a:rPr lang="en-US" sz="2800" dirty="0" err="1"/>
+              <a:rPr lang="en-US" sz="2500" dirty="0"/>
+              <a:t> </a:t>
+            </a:r>
+            <a:r>
+              <a:rPr lang="en-US" sz="2500" dirty="0" err="1"/>
               <a:t>đăng</a:t>
             </a:r>
             <a:r>
-              <a:rPr lang="en-US" sz="2800" dirty="0"/>
-              <a:t> </a:t>
-            </a:r>
-            <a:r>
-              <a:rPr lang="en-US" sz="2800" dirty="0" err="1"/>
+              <a:rPr lang="en-US" sz="2500" dirty="0"/>
+              <a:t> </a:t>
+            </a:r>
+            <a:r>
+              <a:rPr lang="en-US" sz="2500" dirty="0" err="1"/>
               <a:t>nhập</a:t>
             </a:r>
             <a:r>
-              <a:rPr lang="en-US" sz="2800" dirty="0"/>
+              <a:rPr lang="en-US" sz="2500" dirty="0"/>
               <a:t>, </a:t>
             </a:r>
             <a:r>
-              <a:rPr lang="en-US" sz="2800" dirty="0" err="1"/>
+              <a:rPr lang="en-US" sz="2500" dirty="0" err="1"/>
               <a:t>lịch</a:t>
             </a:r>
             <a:r>
-              <a:rPr lang="en-US" sz="2800" dirty="0"/>
-              <a:t> </a:t>
-            </a:r>
-            <a:r>
-              <a:rPr lang="en-US" sz="2800" dirty="0" err="1"/>
+              <a:rPr lang="en-US" sz="2500" dirty="0"/>
+              <a:t> </a:t>
+            </a:r>
+            <a:r>
+              <a:rPr lang="en-US" sz="2500" dirty="0" err="1"/>
               <a:t>sử</a:t>
             </a:r>
             <a:r>
-              <a:rPr lang="en-US" sz="2800" dirty="0"/>
-              <a:t> </a:t>
-            </a:r>
-            <a:r>
-              <a:rPr lang="en-US" sz="2800" dirty="0" err="1"/>
+              <a:rPr lang="en-US" sz="2500" dirty="0"/>
+              <a:t> </a:t>
+            </a:r>
+            <a:r>
+              <a:rPr lang="en-US" sz="2500" dirty="0" err="1"/>
               <a:t>đăng</a:t>
             </a:r>
             <a:r>
-              <a:rPr lang="en-US" sz="2800" dirty="0"/>
-              <a:t> </a:t>
-            </a:r>
-            <a:r>
-              <a:rPr lang="en-US" sz="2800" dirty="0" err="1"/>
+              <a:rPr lang="en-US" sz="2500" dirty="0"/>
+              <a:t> </a:t>
+            </a:r>
+            <a:r>
+              <a:rPr lang="en-US" sz="2500" dirty="0" err="1"/>
               <a:t>nhập</a:t>
             </a:r>
             <a:r>
-              <a:rPr lang="en-US" sz="2800" dirty="0"/>
+              <a:rPr lang="en-US" sz="2500" dirty="0"/>
               <a:t>, </a:t>
             </a:r>
             <a:r>
-              <a:rPr lang="en-US" sz="2800" dirty="0" err="1"/>
+              <a:rPr lang="en-US" sz="2500" dirty="0" err="1"/>
               <a:t>tạo</a:t>
             </a:r>
             <a:r>
-              <a:rPr lang="en-US" sz="2800" dirty="0"/>
-              <a:t> </a:t>
-            </a:r>
-            <a:r>
-              <a:rPr lang="en-US" sz="2800" dirty="0" err="1"/>
+              <a:rPr lang="en-US" sz="2500" dirty="0"/>
+              <a:t> </a:t>
+            </a:r>
+            <a:r>
+              <a:rPr lang="en-US" sz="2500" dirty="0" err="1"/>
               <a:t>thông</a:t>
             </a:r>
             <a:r>
-              <a:rPr lang="en-US" sz="2800" dirty="0"/>
-              <a:t> </a:t>
-            </a:r>
-            <a:r>
-              <a:rPr lang="en-US" sz="2800" dirty="0" err="1"/>
+              <a:rPr lang="en-US" sz="2500" dirty="0"/>
+              <a:t> </a:t>
+            </a:r>
+            <a:r>
+              <a:rPr lang="en-US" sz="2500" dirty="0" err="1"/>
               <a:t>báo</a:t>
             </a:r>
             <a:r>
-              <a:rPr lang="en-US" sz="2800" dirty="0"/>
-              <a:t> </a:t>
-            </a:r>
-            <a:r>
-              <a:rPr lang="en-US" sz="2800" dirty="0" err="1"/>
+              <a:rPr lang="en-US" sz="2500" dirty="0"/>
+              <a:t> </a:t>
+            </a:r>
+            <a:r>
+              <a:rPr lang="en-US" sz="2500" dirty="0" err="1"/>
               <a:t>cho</a:t>
             </a:r>
             <a:r>
-              <a:rPr lang="en-US" sz="2800" dirty="0"/>
-              <a:t> </a:t>
-            </a:r>
-            <a:r>
-              <a:rPr lang="en-US" sz="2800" dirty="0" err="1"/>
+              <a:rPr lang="en-US" sz="2500" dirty="0"/>
+              <a:t> </a:t>
+            </a:r>
+            <a:r>
+              <a:rPr lang="en-US" sz="2500" dirty="0" err="1"/>
               <a:t>những</a:t>
             </a:r>
             <a:r>
-              <a:rPr lang="en-US" sz="2800" dirty="0"/>
-              <a:t> </a:t>
-            </a:r>
-            <a:r>
-              <a:rPr lang="en-US" sz="2800" dirty="0" err="1"/>
+              <a:rPr lang="en-US" sz="2500" dirty="0"/>
+              <a:t> </a:t>
+            </a:r>
+            <a:r>
+              <a:rPr lang="en-US" sz="2500" dirty="0" err="1"/>
               <a:t>người</a:t>
             </a:r>
             <a:r>
-              <a:rPr lang="en-US" sz="2800" dirty="0"/>
-              <a:t> </a:t>
-            </a:r>
-            <a:r>
-              <a:rPr lang="en-US" sz="2800" dirty="0" err="1"/>
+              <a:rPr lang="en-US" sz="2500" dirty="0"/>
+              <a:t> </a:t>
+            </a:r>
+            <a:r>
+              <a:rPr lang="en-US" sz="2500" dirty="0" err="1"/>
               <a:t>dùng</a:t>
             </a:r>
             <a:r>
-              <a:rPr lang="en-US" sz="2800" dirty="0"/>
-              <a:t> </a:t>
-            </a:r>
-            <a:r>
-              <a:rPr lang="en-US" sz="2800" dirty="0" err="1"/>
+              <a:rPr lang="en-US" sz="2500" dirty="0"/>
+              <a:t> </a:t>
+            </a:r>
+            <a:r>
+              <a:rPr lang="en-US" sz="2500" dirty="0" err="1"/>
               <a:t>khác</a:t>
             </a:r>
-            <a:endParaRPr lang="en-US" sz="2800" dirty="0"/>
+            <a:endParaRPr lang="en-US" sz="2500" dirty="0"/>
           </a:p>
           <a:p>
             <a:pPr lvl="1"/>
             <a:r>
-              <a:rPr lang="en-US" sz="2800" dirty="0" err="1" smtClean="0"/>
+              <a:rPr lang="en-US" sz="2500" dirty="0" err="1" smtClean="0"/>
               <a:t>Nhận</a:t>
             </a:r>
             <a:r>
-              <a:rPr lang="en-US" sz="2800" dirty="0" smtClean="0"/>
-              <a:t> </a:t>
-            </a:r>
-            <a:r>
-              <a:rPr lang="en-US" sz="2800" dirty="0" err="1"/>
+              <a:rPr lang="en-US" sz="2500" dirty="0" smtClean="0"/>
+              <a:t> </a:t>
+            </a:r>
+            <a:r>
+              <a:rPr lang="en-US" sz="2500" dirty="0" err="1"/>
               <a:t>mọi</a:t>
             </a:r>
             <a:r>
-              <a:rPr lang="en-US" sz="2800" dirty="0"/>
-              <a:t> </a:t>
-            </a:r>
-            <a:r>
-              <a:rPr lang="en-US" sz="2800" dirty="0" err="1"/>
+              <a:rPr lang="en-US" sz="2500" dirty="0"/>
+              <a:t> </a:t>
+            </a:r>
+            <a:r>
+              <a:rPr lang="en-US" sz="2500" dirty="0" err="1"/>
               <a:t>yêu</a:t>
             </a:r>
             <a:r>
-              <a:rPr lang="en-US" sz="2800" dirty="0"/>
-              <a:t> </a:t>
-            </a:r>
-            <a:r>
-              <a:rPr lang="en-US" sz="2800" dirty="0" err="1"/>
+              <a:rPr lang="en-US" sz="2500" dirty="0"/>
+              <a:t> </a:t>
+            </a:r>
+            <a:r>
+              <a:rPr lang="en-US" sz="2500" dirty="0" err="1"/>
               <a:t>cầu</a:t>
             </a:r>
             <a:r>
-              <a:rPr lang="en-US" sz="2800" dirty="0"/>
-              <a:t> </a:t>
-            </a:r>
-            <a:r>
-              <a:rPr lang="en-US" sz="2800" dirty="0" err="1"/>
+              <a:rPr lang="en-US" sz="2500" dirty="0"/>
+              <a:t> </a:t>
+            </a:r>
+            <a:r>
+              <a:rPr lang="en-US" sz="2500" dirty="0" err="1"/>
               <a:t>từ</a:t>
             </a:r>
             <a:r>
-              <a:rPr lang="en-US" sz="2800" dirty="0"/>
-              <a:t> </a:t>
-            </a:r>
-            <a:r>
-              <a:rPr lang="en-US" sz="2800" dirty="0" err="1"/>
+              <a:rPr lang="en-US" sz="2500" dirty="0"/>
+              <a:t> </a:t>
+            </a:r>
+            <a:r>
+              <a:rPr lang="en-US" sz="2500" dirty="0" err="1"/>
               <a:t>thiết</a:t>
             </a:r>
             <a:r>
-              <a:rPr lang="en-US" sz="2800" dirty="0"/>
-              <a:t> </a:t>
-            </a:r>
-            <a:r>
-              <a:rPr lang="en-US" sz="2800" dirty="0" err="1"/>
+              <a:rPr lang="en-US" sz="2500" dirty="0"/>
+              <a:t> </a:t>
+            </a:r>
+            <a:r>
+              <a:rPr lang="en-US" sz="2500" dirty="0" err="1"/>
               <a:t>bị</a:t>
             </a:r>
             <a:r>
-              <a:rPr lang="en-US" sz="2800" dirty="0"/>
+              <a:rPr lang="en-US" sz="2500" dirty="0"/>
               <a:t> di </a:t>
             </a:r>
             <a:r>
-              <a:rPr lang="en-US" sz="2800" dirty="0" err="1"/>
+              <a:rPr lang="en-US" sz="2500" dirty="0" err="1"/>
               <a:t>động</a:t>
             </a:r>
             <a:r>
-              <a:rPr lang="en-US" sz="2800" dirty="0"/>
+              <a:rPr lang="en-US" sz="2500" dirty="0"/>
               <a:t>: </a:t>
             </a:r>
             <a:r>
-              <a:rPr lang="en-US" sz="2800" dirty="0" err="1"/>
+              <a:rPr lang="en-US" sz="2500" dirty="0" err="1"/>
               <a:t>Lấy</a:t>
             </a:r>
             <a:r>
-              <a:rPr lang="en-US" sz="2800" dirty="0"/>
-              <a:t> </a:t>
-            </a:r>
-            <a:r>
-              <a:rPr lang="en-US" sz="2800" dirty="0" err="1"/>
+              <a:rPr lang="en-US" sz="2500" dirty="0"/>
+              <a:t> </a:t>
+            </a:r>
+            <a:r>
+              <a:rPr lang="en-US" sz="2500" dirty="0" err="1"/>
               <a:t>dữ</a:t>
             </a:r>
             <a:r>
-              <a:rPr lang="en-US" sz="2800" dirty="0"/>
-              <a:t> </a:t>
-            </a:r>
-            <a:r>
-              <a:rPr lang="en-US" sz="2800" dirty="0" err="1"/>
+              <a:rPr lang="en-US" sz="2500" dirty="0"/>
+              <a:t> </a:t>
+            </a:r>
+            <a:r>
+              <a:rPr lang="en-US" sz="2500" dirty="0" err="1"/>
               <a:t>liệu</a:t>
             </a:r>
             <a:r>
-              <a:rPr lang="en-US" sz="2800" dirty="0"/>
+              <a:rPr lang="en-US" sz="2500" dirty="0"/>
               <a:t>, </a:t>
             </a:r>
             <a:r>
-              <a:rPr lang="en-US" sz="2800" dirty="0" err="1"/>
+              <a:rPr lang="en-US" sz="2500" dirty="0" err="1"/>
               <a:t>nhận</a:t>
             </a:r>
             <a:r>
-              <a:rPr lang="en-US" sz="2800" dirty="0"/>
-              <a:t> </a:t>
-            </a:r>
-            <a:r>
-              <a:rPr lang="en-US" sz="2800" dirty="0" err="1"/>
+              <a:rPr lang="en-US" sz="2500" dirty="0"/>
+              <a:t> </a:t>
+            </a:r>
+            <a:r>
+              <a:rPr lang="en-US" sz="2500" dirty="0" err="1"/>
               <a:t>dữ</a:t>
             </a:r>
             <a:r>
-              <a:rPr lang="en-US" sz="2800" dirty="0"/>
-              <a:t> </a:t>
-            </a:r>
-            <a:r>
-              <a:rPr lang="en-US" sz="2800" dirty="0" err="1"/>
+              <a:rPr lang="en-US" sz="2500" dirty="0"/>
+              <a:t> </a:t>
+            </a:r>
+            <a:r>
+              <a:rPr lang="en-US" sz="2500" dirty="0" err="1"/>
               <a:t>liệu</a:t>
             </a:r>
             <a:r>
-              <a:rPr lang="en-US" sz="2800" dirty="0"/>
-              <a:t> </a:t>
-            </a:r>
-            <a:r>
-              <a:rPr lang="en-US" sz="2800" dirty="0" err="1"/>
+              <a:rPr lang="en-US" sz="2500" dirty="0"/>
+              <a:t> </a:t>
+            </a:r>
+            <a:r>
+              <a:rPr lang="en-US" sz="2500" dirty="0" err="1"/>
               <a:t>và</a:t>
             </a:r>
             <a:r>
-              <a:rPr lang="en-US" sz="2800" dirty="0"/>
-              <a:t> </a:t>
-            </a:r>
-            <a:r>
-              <a:rPr lang="en-US" sz="2800" dirty="0" err="1"/>
+              <a:rPr lang="en-US" sz="2500" dirty="0"/>
+              <a:t> </a:t>
+            </a:r>
+            <a:r>
+              <a:rPr lang="en-US" sz="2500" dirty="0" err="1"/>
               <a:t>lưu</a:t>
             </a:r>
             <a:r>
-              <a:rPr lang="en-US" sz="2800" dirty="0"/>
-              <a:t> </a:t>
-            </a:r>
-            <a:r>
-              <a:rPr lang="en-US" sz="2800" dirty="0" err="1"/>
+              <a:rPr lang="en-US" sz="2500" dirty="0"/>
+              <a:t> </a:t>
+            </a:r>
+            <a:r>
+              <a:rPr lang="en-US" sz="2500" dirty="0" err="1"/>
               <a:t>lại</a:t>
             </a:r>
             <a:r>
-              <a:rPr lang="en-US" sz="2800" dirty="0"/>
-              <a:t> </a:t>
-            </a:r>
-            <a:r>
-              <a:rPr lang="en-US" sz="2800" dirty="0" err="1"/>
+              <a:rPr lang="en-US" sz="2500" dirty="0"/>
+              <a:t> </a:t>
+            </a:r>
+            <a:r>
+              <a:rPr lang="en-US" sz="2500" dirty="0" err="1"/>
               <a:t>trên</a:t>
             </a:r>
             <a:r>
-              <a:rPr lang="en-US" sz="2800" dirty="0"/>
-              <a:t> </a:t>
-            </a:r>
-            <a:r>
-              <a:rPr lang="en-US" sz="2800" dirty="0" err="1"/>
+              <a:rPr lang="en-US" sz="2500" dirty="0"/>
+              <a:t> </a:t>
+            </a:r>
+            <a:r>
+              <a:rPr lang="en-US" sz="2500" dirty="0" err="1"/>
               <a:t>hệ</a:t>
             </a:r>
             <a:r>
-              <a:rPr lang="en-US" sz="2800" dirty="0"/>
-              <a:t> </a:t>
-            </a:r>
-            <a:r>
-              <a:rPr lang="en-US" sz="2800" dirty="0" err="1"/>
+              <a:rPr lang="en-US" sz="2500" dirty="0"/>
+              <a:t> </a:t>
+            </a:r>
+            <a:r>
+              <a:rPr lang="en-US" sz="2500" dirty="0" err="1"/>
               <a:t>thống</a:t>
             </a:r>
             <a:r>
-              <a:rPr lang="en-US" sz="2800" dirty="0"/>
+              <a:rPr lang="en-US" sz="2500" dirty="0"/>
               <a:t> </a:t>
             </a:r>
           </a:p>
@@ -25516,6 +25559,78 @@
               <a:rPr lang="en-US" sz="2800" dirty="0" err="1" smtClean="0"/>
               <a:t>hàng</a:t>
             </a:r>
+            <a:r>
+              <a:rPr lang="en-US" sz="2800" dirty="0" smtClean="0"/>
+              <a:t>. </a:t>
+            </a:r>
+            <a:r>
+              <a:rPr lang="en-US" sz="2800" dirty="0" err="1" smtClean="0"/>
+              <a:t>Vị</a:t>
+            </a:r>
+            <a:r>
+              <a:rPr lang="en-US" sz="2800" dirty="0" smtClean="0"/>
+              <a:t> </a:t>
+            </a:r>
+            <a:r>
+              <a:rPr lang="en-US" sz="2800" dirty="0" err="1" smtClean="0"/>
+              <a:t>trí</a:t>
+            </a:r>
+            <a:r>
+              <a:rPr lang="en-US" sz="2800" dirty="0" smtClean="0"/>
+              <a:t> </a:t>
+            </a:r>
+            <a:r>
+              <a:rPr lang="en-US" sz="2800" dirty="0" err="1" smtClean="0"/>
+              <a:t>khách</a:t>
+            </a:r>
+            <a:r>
+              <a:rPr lang="en-US" sz="2800" dirty="0" smtClean="0"/>
+              <a:t> </a:t>
+            </a:r>
+            <a:r>
+              <a:rPr lang="en-US" sz="2800" dirty="0" err="1" smtClean="0"/>
+              <a:t>hàng</a:t>
+            </a:r>
+            <a:r>
+              <a:rPr lang="en-US" sz="2800" dirty="0" smtClean="0"/>
+              <a:t>, </a:t>
+            </a:r>
+            <a:r>
+              <a:rPr lang="en-US" sz="2800" dirty="0" err="1" smtClean="0"/>
+              <a:t>lộ</a:t>
+            </a:r>
+            <a:r>
+              <a:rPr lang="en-US" sz="2800" dirty="0" smtClean="0"/>
+              <a:t> </a:t>
+            </a:r>
+            <a:r>
+              <a:rPr lang="en-US" sz="2800" dirty="0" err="1" smtClean="0"/>
+              <a:t>trình</a:t>
+            </a:r>
+            <a:r>
+              <a:rPr lang="en-US" sz="2800" dirty="0" smtClean="0"/>
+              <a:t> </a:t>
+            </a:r>
+            <a:r>
+              <a:rPr lang="en-US" sz="2800" dirty="0" err="1" smtClean="0"/>
+              <a:t>của</a:t>
+            </a:r>
+            <a:r>
+              <a:rPr lang="en-US" sz="2800" dirty="0" smtClean="0"/>
+              <a:t> </a:t>
+            </a:r>
+            <a:r>
+              <a:rPr lang="en-US" sz="2800" dirty="0" err="1" smtClean="0"/>
+              <a:t>nhân</a:t>
+            </a:r>
+            <a:r>
+              <a:rPr lang="en-US" sz="2800" dirty="0" smtClean="0"/>
+              <a:t> </a:t>
+            </a:r>
+            <a:r>
+              <a:rPr lang="en-US" sz="2800" dirty="0" err="1" smtClean="0"/>
+              <a:t>viên</a:t>
+            </a:r>
             <a:endParaRPr lang="en-US" sz="2800" dirty="0"/>
           </a:p>
           <a:p>
@@ -25543,6 +25658,13 @@
   <p:clrMapOvr>
     <a:masterClrMapping/>
   </p:clrMapOvr>
+  <p:timing>
+    <p:tnLst>
+      <p:par>
+        <p:cTn id="1" dur="indefinite" restart="never" nodeType="tmRoot"/>
+      </p:par>
+    </p:tnLst>
+  </p:timing>
 </p:sld>
 </file>
 
@@ -25604,7 +25726,12 @@
             <p:ph idx="1"/>
           </p:nvPr>
         </p:nvSpPr>
-        <p:spPr/>
+        <p:spPr>
+          <a:xfrm>
+            <a:off x="152400" y="1076325"/>
+            <a:ext cx="8839200" cy="5248275"/>
+          </a:xfrm>
+        </p:spPr>
         <p:txBody>
           <a:bodyPr/>
           <a:lstStyle/>
@@ -25691,6 +25818,74 @@
             <a:endParaRPr lang="en-US" sz="2800" dirty="0" smtClean="0"/>
           </a:p>
           <a:p>
+            <a:pPr marL="479425" lvl="1" indent="0">
+              <a:buNone/>
+            </a:pPr>
+            <a:r>
+              <a:rPr lang="en-US" sz="2800" dirty="0"/>
+              <a:t> </a:t>
+            </a:r>
+            <a:r>
+              <a:rPr lang="en-US" sz="2800" dirty="0" smtClean="0"/>
+              <a:t>   </a:t>
+            </a:r>
+            <a:r>
+              <a:rPr lang="en-US" sz="2800" dirty="0" smtClean="0">
+                <a:sym typeface="Symbol"/>
+              </a:rPr>
+              <a:t> </a:t>
+            </a:r>
+            <a:r>
+              <a:rPr lang="en-US" sz="2800" i="1" dirty="0" err="1" smtClean="0">
+                <a:sym typeface="Symbol"/>
+              </a:rPr>
+              <a:t>Để</a:t>
+            </a:r>
+            <a:r>
+              <a:rPr lang="en-US" sz="2800" i="1" dirty="0" smtClean="0">
+                <a:sym typeface="Symbol"/>
+              </a:rPr>
+              <a:t> </a:t>
+            </a:r>
+            <a:r>
+              <a:rPr lang="en-US" sz="2800" i="1" dirty="0" err="1" smtClean="0">
+                <a:sym typeface="Symbol"/>
+              </a:rPr>
+              <a:t>quản</a:t>
+            </a:r>
+            <a:r>
+              <a:rPr lang="en-US" sz="2800" i="1" dirty="0" smtClean="0">
+                <a:sym typeface="Symbol"/>
+              </a:rPr>
+              <a:t> </a:t>
+            </a:r>
+            <a:r>
+              <a:rPr lang="en-US" sz="2800" i="1" dirty="0" err="1" smtClean="0">
+                <a:sym typeface="Symbol"/>
+              </a:rPr>
+              <a:t>lý</a:t>
+            </a:r>
+            <a:r>
+              <a:rPr lang="en-US" sz="2800" i="1" dirty="0" smtClean="0">
+                <a:sym typeface="Symbol"/>
+              </a:rPr>
+              <a:t> </a:t>
+            </a:r>
+            <a:r>
+              <a:rPr lang="en-US" sz="2800" i="1" dirty="0" err="1" smtClean="0">
+                <a:sym typeface="Symbol"/>
+              </a:rPr>
+              <a:t>thông</a:t>
+            </a:r>
+            <a:r>
+              <a:rPr lang="en-US" sz="2800" i="1" dirty="0" smtClean="0">
+                <a:sym typeface="Symbol"/>
+              </a:rPr>
+              <a:t> tin</a:t>
+            </a:r>
+            <a:endParaRPr lang="en-US" sz="2800" i="1" dirty="0" smtClean="0"/>
+          </a:p>
+          <a:p>
             <a:pPr lvl="1"/>
             <a:r>
               <a:rPr lang="en-US" sz="2800" dirty="0" err="1" smtClean="0"/>
@@ -25770,8 +25965,150 @@
             </a:r>
             <a:r>
               <a:rPr lang="en-US" sz="2800" dirty="0" smtClean="0"/>
-              <a:t> minh</a:t>
-            </a:r>
+              <a:t> </a:t>
+            </a:r>
+            <a:r>
+              <a:rPr lang="en-US" sz="2800" dirty="0" smtClean="0"/>
+              <a:t>minh</a:t>
+            </a:r>
+          </a:p>
+          <a:p>
+            <a:pPr marL="957262" lvl="2" indent="0">
+              <a:buNone/>
+            </a:pPr>
+            <a:r>
+              <a:rPr lang="en-US" sz="2800" dirty="0" smtClean="0">
+                <a:sym typeface="Symbol"/>
+              </a:rPr>
+              <a:t> </a:t>
+            </a:r>
+            <a:r>
+              <a:rPr lang="en-US" sz="2800" i="1" dirty="0" err="1" smtClean="0">
+                <a:sym typeface="Symbol"/>
+              </a:rPr>
+              <a:t>Để</a:t>
+            </a:r>
+            <a:r>
+              <a:rPr lang="en-US" sz="2800" i="1" dirty="0" smtClean="0">
+                <a:sym typeface="Symbol"/>
+              </a:rPr>
+              <a:t> </a:t>
+            </a:r>
+            <a:r>
+              <a:rPr lang="en-US" sz="2800" i="1" dirty="0" err="1" smtClean="0">
+                <a:sym typeface="Symbol"/>
+              </a:rPr>
+              <a:t>đặt</a:t>
+            </a:r>
+            <a:r>
+              <a:rPr lang="en-US" sz="2800" i="1" dirty="0" smtClean="0">
+                <a:sym typeface="Symbol"/>
+              </a:rPr>
+              <a:t> </a:t>
+            </a:r>
+            <a:r>
+              <a:rPr lang="en-US" sz="2800" i="1" dirty="0" err="1" smtClean="0">
+                <a:sym typeface="Symbol"/>
+              </a:rPr>
+              <a:t>hàng</a:t>
+            </a:r>
+            <a:r>
+              <a:rPr lang="en-US" sz="2800" i="1" dirty="0" smtClean="0">
+                <a:sym typeface="Symbol"/>
+              </a:rPr>
+              <a:t>, </a:t>
+            </a:r>
+            <a:r>
+              <a:rPr lang="en-US" sz="2800" i="1" dirty="0" err="1" smtClean="0">
+                <a:sym typeface="Symbol"/>
+              </a:rPr>
+              <a:t>bán</a:t>
+            </a:r>
+            <a:r>
+              <a:rPr lang="en-US" sz="2800" i="1" dirty="0" smtClean="0">
+                <a:sym typeface="Symbol"/>
+              </a:rPr>
+              <a:t> </a:t>
+            </a:r>
+            <a:r>
+              <a:rPr lang="en-US" sz="2800" i="1" dirty="0" err="1" smtClean="0">
+                <a:sym typeface="Symbol"/>
+              </a:rPr>
+              <a:t>hàng</a:t>
+            </a:r>
+            <a:r>
+              <a:rPr lang="en-US" sz="2800" i="1" dirty="0" smtClean="0">
+                <a:sym typeface="Symbol"/>
+              </a:rPr>
+              <a:t>, </a:t>
+            </a:r>
+            <a:r>
+              <a:rPr lang="en-US" sz="2800" i="1" dirty="0" err="1" smtClean="0">
+                <a:sym typeface="Symbol"/>
+              </a:rPr>
+              <a:t>kiểm</a:t>
+            </a:r>
+            <a:r>
+              <a:rPr lang="en-US" sz="2800" i="1" dirty="0" smtClean="0">
+                <a:sym typeface="Symbol"/>
+              </a:rPr>
+              <a:t> </a:t>
+            </a:r>
+            <a:r>
+              <a:rPr lang="en-US" sz="2800" i="1" dirty="0" err="1" smtClean="0">
+                <a:sym typeface="Symbol"/>
+              </a:rPr>
+              <a:t>kê</a:t>
+            </a:r>
+            <a:r>
+              <a:rPr lang="en-US" sz="2800" i="1" dirty="0" smtClean="0">
+                <a:sym typeface="Symbol"/>
+              </a:rPr>
+              <a:t> </a:t>
+            </a:r>
+            <a:r>
+              <a:rPr lang="en-US" sz="2800" i="1" dirty="0" err="1" smtClean="0">
+                <a:sym typeface="Symbol"/>
+              </a:rPr>
+              <a:t>kho</a:t>
+            </a:r>
+            <a:r>
+              <a:rPr lang="en-US" sz="2800" i="1" dirty="0" smtClean="0">
+                <a:sym typeface="Symbol"/>
+              </a:rPr>
+              <a:t> </a:t>
+            </a:r>
+            <a:r>
+              <a:rPr lang="en-US" sz="2800" i="1" dirty="0" err="1" smtClean="0">
+                <a:sym typeface="Symbol"/>
+              </a:rPr>
+              <a:t>cho</a:t>
+            </a:r>
+            <a:r>
+              <a:rPr lang="en-US" sz="2800" i="1" dirty="0" smtClean="0">
+                <a:sym typeface="Symbol"/>
+              </a:rPr>
+              <a:t> </a:t>
+            </a:r>
+            <a:r>
+              <a:rPr lang="en-US" sz="2800" i="1" dirty="0" err="1" smtClean="0">
+                <a:sym typeface="Symbol"/>
+              </a:rPr>
+              <a:t>nhân</a:t>
+            </a:r>
+            <a:r>
+              <a:rPr lang="en-US" sz="2800" i="1" dirty="0" smtClean="0">
+                <a:sym typeface="Symbol"/>
+              </a:rPr>
+              <a:t> </a:t>
+            </a:r>
+            <a:r>
+              <a:rPr lang="en-US" sz="2800" i="1" dirty="0" err="1" smtClean="0">
+                <a:sym typeface="Symbol"/>
+              </a:rPr>
+              <a:t>viên</a:t>
+            </a:r>
+            <a:endParaRPr lang="en-US" sz="2800" i="1" dirty="0" smtClean="0"/>
           </a:p>
           <a:p>
             <a:pPr lvl="1"/>
@@ -26424,6 +26761,27 @@
           <a:bodyPr/>
           <a:lstStyle/>
           <a:p>
+            <a:pPr marL="0" indent="0">
+              <a:buNone/>
+            </a:pPr>
+            <a:r>
+              <a:rPr lang="en-US" sz="2800" u="sng" dirty="0" err="1" smtClean="0"/>
+              <a:t>Mô</a:t>
+            </a:r>
+            <a:r>
+              <a:rPr lang="en-US" sz="2800" u="sng" dirty="0" smtClean="0"/>
+              <a:t> </a:t>
+            </a:r>
+            <a:r>
+              <a:rPr lang="en-US" sz="2800" u="sng" dirty="0" err="1" smtClean="0"/>
+              <a:t>hình</a:t>
+            </a:r>
+            <a:r>
+              <a:rPr lang="en-US" sz="2800" u="sng" dirty="0" smtClean="0"/>
+              <a:t>:</a:t>
+            </a:r>
+          </a:p>
+          <a:p>
             <a:r>
               <a:rPr lang="en-US" sz="2800" b="0" dirty="0" err="1" smtClean="0"/>
               <a:t>Sử</a:t>
@@ -26621,6 +26979,27 @@
         <p:txBody>
           <a:bodyPr/>
           <a:lstStyle/>
+          <a:p>
+            <a:pPr marL="0" indent="0">
+              <a:buNone/>
+            </a:pPr>
+            <a:r>
+              <a:rPr lang="en-US" sz="2800" u="sng" dirty="0" err="1" smtClean="0"/>
+              <a:t>Công</a:t>
+            </a:r>
+            <a:r>
+              <a:rPr lang="en-US" sz="2800" u="sng" dirty="0" smtClean="0"/>
+              <a:t> </a:t>
+            </a:r>
+            <a:r>
+              <a:rPr lang="en-US" sz="2800" u="sng" dirty="0" err="1" smtClean="0"/>
+              <a:t>nghệ</a:t>
+            </a:r>
+            <a:r>
+              <a:rPr lang="en-US" sz="2800" u="sng" dirty="0" smtClean="0"/>
+              <a:t>:</a:t>
+            </a:r>
+          </a:p>
           <a:p>
             <a:r>
               <a:rPr lang="en-US" sz="2800" b="0" dirty="0" err="1" smtClean="0"/>

</xml_diff>

<commit_message>
Add more icon for slide
</commit_message>
<xml_diff>
--- a/Report/BaoVe/TrinhDien/Slide.pptx
+++ b/Report/BaoVe/TrinhDien/Slide.pptx
@@ -251,7 +251,7 @@
           <a:p>
             <a:fld id="{6C4B228C-91BA-4C5A-9B34-CF38153759C1}" type="datetimeFigureOut">
               <a:rPr lang="en-US" smtClean="0"/>
-              <a:t>6/11/2014</a:t>
+              <a:t>6/12/2014</a:t>
             </a:fld>
             <a:endParaRPr lang="en-US"/>
           </a:p>
@@ -10635,11 +10635,7 @@
             </a:r>
             <a:r>
               <a:rPr lang="en-US" sz="2800" b="0" dirty="0" smtClean="0"/>
-              <a:t> </a:t>
-            </a:r>
-            <a:r>
-              <a:rPr lang="en-US" sz="2800" b="0" dirty="0" smtClean="0"/>
-              <a:t>framework </a:t>
+              <a:t> framework </a:t>
             </a:r>
             <a:r>
               <a:rPr lang="en-US" sz="2800" b="0" dirty="0" err="1" smtClean="0"/>
@@ -11752,182 +11748,6 @@
             <a:endParaRPr lang="en-US" sz="2800" b="0" dirty="0" smtClean="0"/>
           </a:p>
           <a:p>
-            <a:endParaRPr lang="en-US" sz="2800" b="0" dirty="0" smtClean="0"/>
-          </a:p>
-          <a:p>
-            <a:r>
-              <a:rPr lang="en-US" sz="2800" b="0" dirty="0" err="1"/>
-              <a:t>Chương</a:t>
-            </a:r>
-            <a:r>
-              <a:rPr lang="en-US" sz="2800" b="0" dirty="0"/>
-              <a:t> </a:t>
-            </a:r>
-            <a:r>
-              <a:rPr lang="en-US" sz="2800" b="0" dirty="0" err="1"/>
-              <a:t>trình</a:t>
-            </a:r>
-            <a:r>
-              <a:rPr lang="en-US" sz="2800" b="0" dirty="0"/>
-              <a:t> </a:t>
-            </a:r>
-            <a:r>
-              <a:rPr lang="en-US" sz="2800" b="0" dirty="0" err="1"/>
-              <a:t>hoạt</a:t>
-            </a:r>
-            <a:r>
-              <a:rPr lang="en-US" sz="2800" b="0" dirty="0"/>
-              <a:t> </a:t>
-            </a:r>
-            <a:r>
-              <a:rPr lang="en-US" sz="2800" b="0" dirty="0" err="1"/>
-              <a:t>động</a:t>
-            </a:r>
-            <a:r>
-              <a:rPr lang="en-US" sz="2800" b="0" dirty="0"/>
-              <a:t> </a:t>
-            </a:r>
-            <a:r>
-              <a:rPr lang="en-US" sz="2800" b="0" dirty="0" err="1"/>
-              <a:t>theo</a:t>
-            </a:r>
-            <a:r>
-              <a:rPr lang="en-US" sz="2800" b="0" dirty="0"/>
-              <a:t> </a:t>
-            </a:r>
-            <a:r>
-              <a:rPr lang="en-US" sz="2800" b="0" dirty="0" err="1"/>
-              <a:t>đúng</a:t>
-            </a:r>
-            <a:r>
-              <a:rPr lang="en-US" sz="2800" b="0" dirty="0"/>
-              <a:t> </a:t>
-            </a:r>
-            <a:r>
-              <a:rPr lang="en-US" sz="2800" b="0" dirty="0" err="1"/>
-              <a:t>quy</a:t>
-            </a:r>
-            <a:r>
-              <a:rPr lang="en-US" sz="2800" b="0" dirty="0"/>
-              <a:t> </a:t>
-            </a:r>
-            <a:r>
-              <a:rPr lang="en-US" sz="2800" b="0" dirty="0" err="1"/>
-              <a:t>trình</a:t>
-            </a:r>
-            <a:r>
-              <a:rPr lang="en-US" sz="2800" b="0" dirty="0"/>
-              <a:t> </a:t>
-            </a:r>
-            <a:r>
-              <a:rPr lang="en-US" sz="2800" b="0" dirty="0" err="1"/>
-              <a:t>nghiệp</a:t>
-            </a:r>
-            <a:r>
-              <a:rPr lang="en-US" sz="2800" b="0" dirty="0"/>
-              <a:t> </a:t>
-            </a:r>
-            <a:r>
-              <a:rPr lang="en-US" sz="2800" b="0" dirty="0" err="1"/>
-              <a:t>vụ</a:t>
-            </a:r>
-            <a:r>
-              <a:rPr lang="en-US" sz="2800" b="0" dirty="0"/>
-              <a:t> </a:t>
-            </a:r>
-            <a:r>
-              <a:rPr lang="en-US" sz="2800" b="0" dirty="0" err="1"/>
-              <a:t>và</a:t>
-            </a:r>
-            <a:r>
-              <a:rPr lang="en-US" sz="2800" b="0" dirty="0"/>
-              <a:t> </a:t>
-            </a:r>
-            <a:r>
-              <a:rPr lang="en-US" sz="2800" b="0" dirty="0" err="1"/>
-              <a:t>cho</a:t>
-            </a:r>
-            <a:r>
-              <a:rPr lang="en-US" sz="2800" b="0" dirty="0"/>
-              <a:t> </a:t>
-            </a:r>
-            <a:r>
-              <a:rPr lang="en-US" sz="2800" b="0" dirty="0" err="1"/>
-              <a:t>kết</a:t>
-            </a:r>
-            <a:r>
-              <a:rPr lang="en-US" sz="2800" b="0" dirty="0"/>
-              <a:t> </a:t>
-            </a:r>
-            <a:r>
-              <a:rPr lang="en-US" sz="2800" b="0" dirty="0" err="1"/>
-              <a:t>quả</a:t>
-            </a:r>
-            <a:r>
-              <a:rPr lang="en-US" sz="2800" b="0" dirty="0"/>
-              <a:t> </a:t>
-            </a:r>
-            <a:r>
-              <a:rPr lang="en-US" sz="2800" b="0" dirty="0" err="1"/>
-              <a:t>hiển</a:t>
-            </a:r>
-            <a:r>
-              <a:rPr lang="en-US" sz="2800" b="0" dirty="0"/>
-              <a:t> </a:t>
-            </a:r>
-            <a:r>
-              <a:rPr lang="en-US" sz="2800" b="0" dirty="0" err="1"/>
-              <a:t>thị</a:t>
-            </a:r>
-            <a:r>
-              <a:rPr lang="en-US" sz="2800" b="0" dirty="0"/>
-              <a:t> </a:t>
-            </a:r>
-            <a:r>
-              <a:rPr lang="en-US" sz="2800" b="0" dirty="0" err="1"/>
-              <a:t>đúng</a:t>
-            </a:r>
-            <a:r>
-              <a:rPr lang="en-US" sz="2800" b="0" dirty="0"/>
-              <a:t>, </a:t>
-            </a:r>
-            <a:r>
-              <a:rPr lang="en-US" sz="2800" b="0" dirty="0" err="1"/>
-              <a:t>không</a:t>
-            </a:r>
-            <a:r>
-              <a:rPr lang="en-US" sz="2800" b="0" dirty="0"/>
-              <a:t> </a:t>
-            </a:r>
-            <a:r>
-              <a:rPr lang="en-US" sz="2800" b="0" dirty="0" err="1"/>
-              <a:t>xảy</a:t>
-            </a:r>
-            <a:r>
-              <a:rPr lang="en-US" sz="2800" b="0" dirty="0"/>
-              <a:t> </a:t>
-            </a:r>
-            <a:r>
-              <a:rPr lang="en-US" sz="2800" b="0" dirty="0" err="1"/>
-              <a:t>ra</a:t>
-            </a:r>
-            <a:r>
-              <a:rPr lang="en-US" sz="2800" b="0" dirty="0"/>
-              <a:t> </a:t>
-            </a:r>
-            <a:r>
-              <a:rPr lang="en-US" sz="2800" b="0" dirty="0" err="1"/>
-              <a:t>lỗi</a:t>
-            </a:r>
-            <a:endParaRPr lang="en-US" sz="2800" b="0" dirty="0"/>
-          </a:p>
-          <a:p>
-            <a:pPr marL="0" indent="0">
-              <a:buNone/>
-            </a:pPr>
-            <a:endParaRPr lang="en-US" sz="2800" b="0" dirty="0" smtClean="0"/>
-          </a:p>
-          <a:p>
             <a:r>
               <a:rPr lang="en-US" sz="2800" b="0" dirty="0" err="1" smtClean="0"/>
               <a:t>Hệ</a:t>
@@ -12688,7 +12508,35 @@
             </a:r>
             <a:r>
               <a:rPr lang="en-US" sz="2800" b="0" dirty="0" smtClean="0"/>
-              <a:t> https </a:t>
+              <a:t> </a:t>
+            </a:r>
+            <a:r>
+              <a:rPr lang="en-US" sz="2800" b="0" dirty="0" smtClean="0"/>
+              <a:t>https, </a:t>
+            </a:r>
+            <a:r>
+              <a:rPr lang="en-US" sz="2800" b="0" dirty="0" err="1" smtClean="0"/>
+              <a:t>chữ</a:t>
+            </a:r>
+            <a:r>
+              <a:rPr lang="en-US" sz="2800" b="0" dirty="0" smtClean="0"/>
+              <a:t> </a:t>
+            </a:r>
+            <a:r>
+              <a:rPr lang="en-US" sz="2800" b="0" dirty="0" err="1" smtClean="0"/>
+              <a:t>ký</a:t>
+            </a:r>
+            <a:r>
+              <a:rPr lang="en-US" sz="2800" b="0" dirty="0" smtClean="0"/>
+              <a:t> </a:t>
+            </a:r>
+            <a:r>
+              <a:rPr lang="en-US" sz="2800" b="0" dirty="0" err="1" smtClean="0"/>
+              <a:t>số</a:t>
+            </a:r>
+            <a:r>
+              <a:rPr lang="en-US" sz="2800" b="0" dirty="0" smtClean="0"/>
+              <a:t> </a:t>
             </a:r>
             <a:r>
               <a:rPr lang="en-US" sz="2800" b="0" dirty="0" err="1" smtClean="0"/>
@@ -12727,12 +12575,12 @@
               <a:t>thông</a:t>
             </a:r>
             <a:r>
-              <a:rPr lang="en-US" sz="2800" b="0" dirty="0" smtClean="0"/>
-              <a:t> tin </a:t>
-            </a:r>
-            <a:r>
-              <a:rPr lang="en-US" sz="2800" b="0" dirty="0" err="1" smtClean="0"/>
-              <a:t>hơn</a:t>
+              <a:rPr lang="en-US" sz="2800" b="0" smtClean="0"/>
+              <a:t> </a:t>
+            </a:r>
+            <a:r>
+              <a:rPr lang="en-US" sz="2800" b="0" smtClean="0"/>
+              <a:t>tin</a:t>
             </a:r>
             <a:endParaRPr lang="en-US" sz="2800" dirty="0" smtClean="0"/>
           </a:p>
@@ -19681,6 +19529,88 @@
           </a:p>
         </p:txBody>
       </p:sp>
+      <p:pic>
+        <p:nvPicPr>
+          <p:cNvPr id="1026" name="Picture 2" descr="P:\Users\HP\Desktop\UML-logo.png"/>
+          <p:cNvPicPr>
+            <a:picLocks noChangeAspect="1" noChangeArrowheads="1"/>
+          </p:cNvPicPr>
+          <p:nvPr/>
+        </p:nvPicPr>
+        <p:blipFill>
+          <a:blip r:embed="rId2" cstate="print">
+            <a:extLst>
+              <a:ext uri="{28A0092B-C50C-407E-A947-70E740481C1C}">
+                <a14:useLocalDpi xmlns:a14="http://schemas.microsoft.com/office/drawing/2010/main" val="0"/>
+              </a:ext>
+            </a:extLst>
+          </a:blip>
+          <a:srcRect/>
+          <a:stretch>
+            <a:fillRect/>
+          </a:stretch>
+        </p:blipFill>
+        <p:spPr bwMode="auto">
+          <a:xfrm>
+            <a:off x="762000" y="3248943"/>
+            <a:ext cx="2286000" cy="2451943"/>
+          </a:xfrm>
+          <a:prstGeom prst="rect">
+            <a:avLst/>
+          </a:prstGeom>
+          <a:noFill/>
+          <a:extLst>
+            <a:ext uri="{909E8E84-426E-40DD-AFC4-6F175D3DCCD1}">
+              <a14:hiddenFill xmlns:a14="http://schemas.microsoft.com/office/drawing/2010/main">
+                <a:solidFill>
+                  <a:srgbClr val="FFFFFF"/>
+                </a:solidFill>
+              </a14:hiddenFill>
+            </a:ext>
+          </a:extLst>
+        </p:spPr>
+      </p:pic>
+      <p:pic>
+        <p:nvPicPr>
+          <p:cNvPr id="1027" name="Picture 3" descr="P:\Users\HP\Desktop\mvc-diagram1.png"/>
+          <p:cNvPicPr>
+            <a:picLocks noChangeAspect="1" noChangeArrowheads="1"/>
+          </p:cNvPicPr>
+          <p:nvPr/>
+        </p:nvPicPr>
+        <p:blipFill>
+          <a:blip r:embed="rId3">
+            <a:extLst>
+              <a:ext uri="{28A0092B-C50C-407E-A947-70E740481C1C}">
+                <a14:useLocalDpi xmlns:a14="http://schemas.microsoft.com/office/drawing/2010/main" val="0"/>
+              </a:ext>
+            </a:extLst>
+          </a:blip>
+          <a:srcRect/>
+          <a:stretch>
+            <a:fillRect/>
+          </a:stretch>
+        </p:blipFill>
+        <p:spPr bwMode="auto">
+          <a:xfrm>
+            <a:off x="3733800" y="2743200"/>
+            <a:ext cx="5076825" cy="3629025"/>
+          </a:xfrm>
+          <a:prstGeom prst="rect">
+            <a:avLst/>
+          </a:prstGeom>
+          <a:noFill/>
+          <a:extLst>
+            <a:ext uri="{909E8E84-426E-40DD-AFC4-6F175D3DCCD1}">
+              <a14:hiddenFill xmlns:a14="http://schemas.microsoft.com/office/drawing/2010/main">
+                <a:solidFill>
+                  <a:srgbClr val="FFFFFF"/>
+                </a:solidFill>
+              </a14:hiddenFill>
+            </a:ext>
+          </a:extLst>
+        </p:spPr>
+      </p:pic>
     </p:spTree>
     <p:extLst>
       <p:ext uri="{BB962C8B-B14F-4D97-AF65-F5344CB8AC3E}">
@@ -20081,11 +20011,7 @@
             </a:r>
             <a:r>
               <a:rPr lang="en-US" sz="2800" b="0" dirty="0" smtClean="0"/>
-              <a:t> Google maps </a:t>
-            </a:r>
-            <a:r>
-              <a:rPr lang="en-US" sz="2800" b="0" dirty="0" smtClean="0"/>
-              <a:t>API v3 </a:t>
+              <a:t> Google maps API v3 </a:t>
             </a:r>
             <a:r>
               <a:rPr lang="en-US" sz="2800" b="0" dirty="0" err="1" smtClean="0"/>
@@ -20141,11 +20067,7 @@
             </a:r>
             <a:r>
               <a:rPr lang="en-US" sz="2800" b="0" dirty="0" smtClean="0"/>
-              <a:t> </a:t>
-            </a:r>
-            <a:r>
-              <a:rPr lang="en-US" sz="2800" b="0" dirty="0" smtClean="0"/>
-              <a:t>GPS</a:t>
+              <a:t> GPS</a:t>
             </a:r>
             <a:endParaRPr lang="en-US" sz="2800" b="0" dirty="0"/>
           </a:p>

</xml_diff>

<commit_message>
Gen pdf .doc of slide
</commit_message>
<xml_diff>
--- a/Report/BaoVe/TrinhDien/Slide.pptx
+++ b/Report/BaoVe/TrinhDien/Slide.pptx
@@ -6729,27 +6729,27 @@
               <a:t> </a:t>
             </a:r>
             <a:r>
-              <a:rPr lang="en-US" sz="2800" dirty="0" err="1"/>
-              <a:t>của</a:t>
-            </a:r>
-            <a:r>
-              <a:rPr lang="en-US" sz="2800" dirty="0"/>
-              <a:t> </a:t>
-            </a:r>
-            <a:r>
-              <a:rPr lang="en-US" sz="2800" dirty="0" err="1"/>
-              <a:t>hệ</a:t>
-            </a:r>
-            <a:r>
-              <a:rPr lang="en-US" sz="2800" dirty="0"/>
-              <a:t> </a:t>
-            </a:r>
-            <a:r>
-              <a:rPr lang="en-US" sz="2800" dirty="0" err="1"/>
-              <a:t>thống</a:t>
-            </a:r>
-            <a:r>
-              <a:rPr lang="en-US" sz="2800" dirty="0"/>
+              <a:rPr lang="en-US" sz="2800" dirty="0" err="1" smtClean="0"/>
+              <a:t>về</a:t>
+            </a:r>
+            <a:r>
+              <a:rPr lang="en-US" sz="2800" dirty="0" smtClean="0"/>
+              <a:t> </a:t>
+            </a:r>
+            <a:r>
+              <a:rPr lang="en-US" sz="2800" dirty="0" err="1" smtClean="0"/>
+              <a:t>phân</a:t>
+            </a:r>
+            <a:r>
+              <a:rPr lang="en-US" sz="2800" dirty="0" smtClean="0"/>
+              <a:t> </a:t>
+            </a:r>
+            <a:r>
+              <a:rPr lang="en-US" sz="2800" dirty="0" err="1" smtClean="0"/>
+              <a:t>phối</a:t>
+            </a:r>
+            <a:r>
+              <a:rPr lang="en-US" sz="2800" dirty="0" smtClean="0"/>
               <a:t>: </a:t>
             </a:r>
             <a:r>
@@ -12508,11 +12508,7 @@
             </a:r>
             <a:r>
               <a:rPr lang="en-US" sz="2800" b="0" dirty="0" smtClean="0"/>
-              <a:t> </a:t>
-            </a:r>
-            <a:r>
-              <a:rPr lang="en-US" sz="2800" b="0" dirty="0" smtClean="0"/>
-              <a:t>https, </a:t>
+              <a:t> https, </a:t>
             </a:r>
             <a:r>
               <a:rPr lang="en-US" sz="2800" b="0" dirty="0" err="1" smtClean="0"/>
@@ -12576,11 +12572,7 @@
             </a:r>
             <a:r>
               <a:rPr lang="en-US" sz="2800" b="0" smtClean="0"/>
-              <a:t> </a:t>
-            </a:r>
-            <a:r>
-              <a:rPr lang="en-US" sz="2800" b="0" smtClean="0"/>
-              <a:t>tin</a:t>
+              <a:t> tin</a:t>
             </a:r>
             <a:endParaRPr lang="en-US" sz="2800" dirty="0" smtClean="0"/>
           </a:p>

</xml_diff>